<commit_message>
adding new architecture diagram
</commit_message>
<xml_diff>
--- a/Posters/ESWC14 - What are the Important Properties of an Entity - Comparing Users and Knowledge Graph Point of View/eswc2014-poster.pptx
+++ b/Posters/ESWC14 - What are the Important Properties of an Entity - Comparing Users and Knowledge Graph Point of View/eswc2014-poster.pptx
@@ -341,7 +341,7 @@
     </p:spTree>
     <p:extLst>
       <p:ext uri="{BB962C8B-B14F-4D97-AF65-F5344CB8AC3E}">
-        <p14:creationId xmlns:p14="http://schemas.microsoft.com/office/powerpoint/2010/main" val="3498610242"/>
+        <p14:creationId xmlns="" xmlns:p14="http://schemas.microsoft.com/office/powerpoint/2010/main" val="3498610242"/>
       </p:ext>
     </p:extLst>
   </p:cSld>
@@ -513,7 +513,7 @@
     </p:spTree>
     <p:extLst>
       <p:ext uri="{BB962C8B-B14F-4D97-AF65-F5344CB8AC3E}">
-        <p14:creationId xmlns:p14="http://schemas.microsoft.com/office/powerpoint/2010/main" val="3408886510"/>
+        <p14:creationId xmlns="" xmlns:p14="http://schemas.microsoft.com/office/powerpoint/2010/main" val="3408886510"/>
       </p:ext>
     </p:extLst>
   </p:cSld>
@@ -695,7 +695,7 @@
     </p:spTree>
     <p:extLst>
       <p:ext uri="{BB962C8B-B14F-4D97-AF65-F5344CB8AC3E}">
-        <p14:creationId xmlns:p14="http://schemas.microsoft.com/office/powerpoint/2010/main" val="3220719012"/>
+        <p14:creationId xmlns="" xmlns:p14="http://schemas.microsoft.com/office/powerpoint/2010/main" val="3220719012"/>
       </p:ext>
     </p:extLst>
   </p:cSld>
@@ -867,7 +867,7 @@
     </p:spTree>
     <p:extLst>
       <p:ext uri="{BB962C8B-B14F-4D97-AF65-F5344CB8AC3E}">
-        <p14:creationId xmlns:p14="http://schemas.microsoft.com/office/powerpoint/2010/main" val="234576983"/>
+        <p14:creationId xmlns="" xmlns:p14="http://schemas.microsoft.com/office/powerpoint/2010/main" val="234576983"/>
       </p:ext>
     </p:extLst>
   </p:cSld>
@@ -1115,7 +1115,7 @@
     </p:spTree>
     <p:extLst>
       <p:ext uri="{BB962C8B-B14F-4D97-AF65-F5344CB8AC3E}">
-        <p14:creationId xmlns:p14="http://schemas.microsoft.com/office/powerpoint/2010/main" val="2455031330"/>
+        <p14:creationId xmlns="" xmlns:p14="http://schemas.microsoft.com/office/powerpoint/2010/main" val="2455031330"/>
       </p:ext>
     </p:extLst>
   </p:cSld>
@@ -1405,7 +1405,7 @@
     </p:spTree>
     <p:extLst>
       <p:ext uri="{BB962C8B-B14F-4D97-AF65-F5344CB8AC3E}">
-        <p14:creationId xmlns:p14="http://schemas.microsoft.com/office/powerpoint/2010/main" val="3551008444"/>
+        <p14:creationId xmlns="" xmlns:p14="http://schemas.microsoft.com/office/powerpoint/2010/main" val="3551008444"/>
       </p:ext>
     </p:extLst>
   </p:cSld>
@@ -1834,7 +1834,7 @@
     </p:spTree>
     <p:extLst>
       <p:ext uri="{BB962C8B-B14F-4D97-AF65-F5344CB8AC3E}">
-        <p14:creationId xmlns:p14="http://schemas.microsoft.com/office/powerpoint/2010/main" val="2621549410"/>
+        <p14:creationId xmlns="" xmlns:p14="http://schemas.microsoft.com/office/powerpoint/2010/main" val="2621549410"/>
       </p:ext>
     </p:extLst>
   </p:cSld>
@@ -1954,7 +1954,7 @@
     </p:spTree>
     <p:extLst>
       <p:ext uri="{BB962C8B-B14F-4D97-AF65-F5344CB8AC3E}">
-        <p14:creationId xmlns:p14="http://schemas.microsoft.com/office/powerpoint/2010/main" val="2337226835"/>
+        <p14:creationId xmlns="" xmlns:p14="http://schemas.microsoft.com/office/powerpoint/2010/main" val="2337226835"/>
       </p:ext>
     </p:extLst>
   </p:cSld>
@@ -2051,7 +2051,7 @@
     </p:spTree>
     <p:extLst>
       <p:ext uri="{BB962C8B-B14F-4D97-AF65-F5344CB8AC3E}">
-        <p14:creationId xmlns:p14="http://schemas.microsoft.com/office/powerpoint/2010/main" val="3450073293"/>
+        <p14:creationId xmlns="" xmlns:p14="http://schemas.microsoft.com/office/powerpoint/2010/main" val="3450073293"/>
       </p:ext>
     </p:extLst>
   </p:cSld>
@@ -2330,7 +2330,7 @@
     </p:spTree>
     <p:extLst>
       <p:ext uri="{BB962C8B-B14F-4D97-AF65-F5344CB8AC3E}">
-        <p14:creationId xmlns:p14="http://schemas.microsoft.com/office/powerpoint/2010/main" val="2517025264"/>
+        <p14:creationId xmlns="" xmlns:p14="http://schemas.microsoft.com/office/powerpoint/2010/main" val="2517025264"/>
       </p:ext>
     </p:extLst>
   </p:cSld>
@@ -2585,7 +2585,7 @@
     </p:spTree>
     <p:extLst>
       <p:ext uri="{BB962C8B-B14F-4D97-AF65-F5344CB8AC3E}">
-        <p14:creationId xmlns:p14="http://schemas.microsoft.com/office/powerpoint/2010/main" val="3855469034"/>
+        <p14:creationId xmlns="" xmlns:p14="http://schemas.microsoft.com/office/powerpoint/2010/main" val="3855469034"/>
       </p:ext>
     </p:extLst>
   </p:cSld>
@@ -2836,7 +2836,7 @@
     </p:spTree>
     <p:extLst>
       <p:ext uri="{BB962C8B-B14F-4D97-AF65-F5344CB8AC3E}">
-        <p14:creationId xmlns:p14="http://schemas.microsoft.com/office/powerpoint/2010/main" val="1581356310"/>
+        <p14:creationId xmlns="" xmlns:p14="http://schemas.microsoft.com/office/powerpoint/2010/main" val="1581356310"/>
       </p:ext>
     </p:extLst>
   </p:cSld>
@@ -3124,21 +3124,54 @@
           <a:chExt cx="0" cy="0"/>
         </a:xfrm>
       </p:grpSpPr>
-      <p:sp>
-        <p:nvSpPr>
-          <p:cNvPr id="14" name="TextBox 13"/>
-          <p:cNvSpPr txBox="1"/>
+      <p:pic>
+        <p:nvPicPr>
+          <p:cNvPr id="1027" name="Picture 3"/>
+          <p:cNvPicPr>
+            <a:picLocks noChangeAspect="1" noChangeArrowheads="1"/>
+          </p:cNvPicPr>
           <p:nvPr/>
-        </p:nvSpPr>
-        <p:spPr>
-          <a:xfrm>
-            <a:off x="15337971" y="4452878"/>
-            <a:ext cx="13116379" cy="2308324"/>
+        </p:nvPicPr>
+        <p:blipFill>
+          <a:blip r:embed="rId2" cstate="print"/>
+          <a:srcRect/>
+          <a:stretch>
+            <a:fillRect/>
+          </a:stretch>
+        </p:blipFill>
+        <p:spPr bwMode="auto">
+          <a:xfrm>
+            <a:off x="26625550" y="4343400"/>
+            <a:ext cx="2743200" cy="2743200"/>
           </a:xfrm>
           <a:prstGeom prst="rect">
             <a:avLst/>
           </a:prstGeom>
           <a:noFill/>
+          <a:ln w="9525">
+            <a:noFill/>
+            <a:miter lim="800000"/>
+            <a:headEnd/>
+            <a:tailEnd/>
+          </a:ln>
+          <a:effectLst/>
+        </p:spPr>
+      </p:pic>
+      <p:sp>
+        <p:nvSpPr>
+          <p:cNvPr id="14" name="TextBox 13"/>
+          <p:cNvSpPr txBox="1"/>
+          <p:nvPr/>
+        </p:nvSpPr>
+        <p:spPr>
+          <a:xfrm>
+            <a:off x="15337971" y="5103674"/>
+            <a:ext cx="13116379" cy="1754326"/>
+          </a:xfrm>
+          <a:prstGeom prst="rect">
+            <a:avLst/>
+          </a:prstGeom>
+          <a:noFill/>
         </p:spPr>
         <p:txBody>
           <a:bodyPr wrap="square" rtlCol="0">
@@ -3147,13 +3180,13 @@
           <a:lstStyle/>
           <a:p>
             <a:pPr algn="ctr"/>
-            <a:endParaRPr lang="en-US" sz="3600" dirty="0" smtClean="0"/>
-          </a:p>
-          <a:p>
-            <a:pPr algn="ctr"/>
             <a:r>
               <a:rPr lang="en-US" sz="3600" dirty="0" smtClean="0"/>
-              <a:t>‡EURECOM </a:t>
+              <a:t>‡</a:t>
+            </a:r>
+            <a:r>
+              <a:rPr lang="en-US" sz="3600" dirty="0" smtClean="0"/>
+              <a:t>EURECOM </a:t>
             </a:r>
           </a:p>
           <a:p>
@@ -3182,10 +3215,10 @@
           <p:nvPr/>
         </p:nvPicPr>
         <p:blipFill>
-          <a:blip r:embed="rId2" cstate="print">
+          <a:blip r:embed="rId3" cstate="print">
             <a:extLst>
               <a:ext uri="{28A0092B-C50C-407E-A947-70E740481C1C}">
-                <a14:useLocalDpi xmlns:a14="http://schemas.microsoft.com/office/drawing/2010/main" val="0"/>
+                <a14:useLocalDpi xmlns="" xmlns:a14="http://schemas.microsoft.com/office/drawing/2010/main" val="0"/>
               </a:ext>
             </a:extLst>
           </a:blip>
@@ -3328,58 +3361,58 @@
           <a:p>
             <a:pPr algn="ctr"/>
             <a:r>
-              <a:rPr lang="en-US" sz="4800" smtClean="0"/>
+              <a:rPr lang="en-US" sz="4800" dirty="0" smtClean="0"/>
               <a:t>Ahmad </a:t>
             </a:r>
             <a:r>
-              <a:rPr lang="en-US" sz="4800" err="1" smtClean="0"/>
+              <a:rPr lang="en-US" sz="4800" dirty="0" err="1" smtClean="0"/>
               <a:t>Assaf</a:t>
             </a:r>
             <a:r>
-              <a:rPr lang="en-US" sz="4800" smtClean="0"/>
+              <a:rPr lang="en-US" sz="4800" dirty="0" smtClean="0"/>
               <a:t>†, </a:t>
             </a:r>
             <a:r>
-              <a:rPr lang="fr-FR" sz="4800" smtClean="0"/>
+              <a:rPr lang="fr-FR" sz="4800" dirty="0" smtClean="0"/>
               <a:t>Ghislain A. </a:t>
             </a:r>
             <a:r>
-              <a:rPr lang="fr-FR" sz="4800" err="1" smtClean="0"/>
+              <a:rPr lang="fr-FR" sz="4800" dirty="0" err="1" smtClean="0"/>
               <a:t>Atemezing</a:t>
             </a:r>
             <a:r>
-              <a:rPr lang="en-US" sz="4800" smtClean="0"/>
+              <a:rPr lang="en-US" sz="4800" dirty="0" smtClean="0"/>
               <a:t>‡, </a:t>
             </a:r>
             <a:r>
-              <a:rPr lang="en-US" sz="4800" err="1" smtClean="0"/>
+              <a:rPr lang="en-US" sz="4800" dirty="0" err="1" smtClean="0"/>
               <a:t>Raphaël</a:t>
             </a:r>
             <a:r>
-              <a:rPr lang="en-US" sz="4800"/>
+              <a:rPr lang="en-US" sz="4800" dirty="0"/>
               <a:t> </a:t>
             </a:r>
             <a:r>
-              <a:rPr lang="en-US" sz="4800" err="1"/>
+              <a:rPr lang="en-US" sz="4800" dirty="0" err="1"/>
               <a:t>Troncy</a:t>
             </a:r>
             <a:r>
-              <a:rPr lang="en-US" sz="4800" smtClean="0"/>
+              <a:rPr lang="en-US" sz="4800" dirty="0" smtClean="0"/>
               <a:t>‡ and </a:t>
             </a:r>
             <a:r>
-              <a:rPr lang="fr-FR" sz="4800" smtClean="0"/>
+              <a:rPr lang="fr-FR" sz="4800" dirty="0" smtClean="0"/>
               <a:t>Elena </a:t>
             </a:r>
             <a:r>
-              <a:rPr lang="fr-FR" sz="4800" err="1" smtClean="0"/>
+              <a:rPr lang="fr-FR" sz="4800" dirty="0" err="1" smtClean="0"/>
               <a:t>Cabrio</a:t>
             </a:r>
             <a:r>
-              <a:rPr lang="en-US" sz="4800" smtClean="0"/>
+              <a:rPr lang="en-US" sz="4800" dirty="0" smtClean="0"/>
               <a:t>‡</a:t>
             </a:r>
-            <a:endParaRPr lang="en-US" sz="4800"/>
+            <a:endParaRPr lang="en-US" sz="4800" dirty="0"/>
           </a:p>
         </p:txBody>
       </p:sp>
@@ -3392,7 +3425,7 @@
         <p:spPr>
           <a:xfrm>
             <a:off x="1022350" y="5047833"/>
-            <a:ext cx="13116379" cy="2185214"/>
+            <a:ext cx="13116379" cy="1754326"/>
           </a:xfrm>
           <a:prstGeom prst="rect">
             <a:avLst/>
@@ -3424,10 +3457,6 @@
               <a:rPr lang="en-US" sz="3600" dirty="0" smtClean="0"/>
               <a:t>ahmad.assaf@sap.com </a:t>
             </a:r>
-          </a:p>
-          <a:p>
-            <a:pPr algn="ctr"/>
-            <a:endParaRPr lang="en-US" sz="2800" dirty="0"/>
           </a:p>
         </p:txBody>
       </p:sp>
@@ -3678,10 +3707,10 @@
           <p:nvPr/>
         </p:nvPicPr>
         <p:blipFill>
-          <a:blip r:embed="rId3" cstate="print">
+          <a:blip r:embed="rId4" cstate="print">
             <a:extLst>
               <a:ext uri="{28A0092B-C50C-407E-A947-70E740481C1C}">
-                <a14:useLocalDpi xmlns:a14="http://schemas.microsoft.com/office/drawing/2010/main" val="0"/>
+                <a14:useLocalDpi xmlns="" xmlns:a14="http://schemas.microsoft.com/office/drawing/2010/main" val="0"/>
               </a:ext>
             </a:extLst>
           </a:blip>
@@ -3701,7 +3730,7 @@
           <a:noFill/>
           <a:extLst>
             <a:ext uri="{909E8E84-426E-40DD-AFC4-6F175D3DCCD1}">
-              <a14:hiddenFill xmlns:a14="http://schemas.microsoft.com/office/drawing/2010/main">
+              <a14:hiddenFill xmlns="" xmlns:a14="http://schemas.microsoft.com/office/drawing/2010/main">
                 <a:solidFill>
                   <a:srgbClr val="FFFFFF"/>
                 </a:solidFill>
@@ -4725,10 +4754,10 @@
           <p:nvPr/>
         </p:nvPicPr>
         <p:blipFill>
-          <a:blip r:embed="rId4" cstate="print">
+          <a:blip r:embed="rId5" cstate="print">
             <a:extLst>
               <a:ext uri="{28A0092B-C50C-407E-A947-70E740481C1C}">
-                <a14:useLocalDpi xmlns:a14="http://schemas.microsoft.com/office/drawing/2010/main" val="0"/>
+                <a14:useLocalDpi xmlns="" xmlns:a14="http://schemas.microsoft.com/office/drawing/2010/main" val="0"/>
               </a:ext>
             </a:extLst>
           </a:blip>
@@ -4752,14 +4781,14 @@
           <a:effectLst/>
           <a:extLst>
             <a:ext uri="{909E8E84-426E-40DD-AFC4-6F175D3DCCD1}">
-              <a14:hiddenFill xmlns:a14="http://schemas.microsoft.com/office/drawing/2010/main">
+              <a14:hiddenFill xmlns="" xmlns:a14="http://schemas.microsoft.com/office/drawing/2010/main">
                 <a:solidFill>
                   <a:schemeClr val="accent1"/>
                 </a:solidFill>
               </a14:hiddenFill>
             </a:ext>
             <a:ext uri="{91240B29-F687-4F45-9708-019B960494DF}">
-              <a14:hiddenLine xmlns:a14="http://schemas.microsoft.com/office/drawing/2010/main" w="9525">
+              <a14:hiddenLine xmlns="" xmlns:a14="http://schemas.microsoft.com/office/drawing/2010/main" w="9525">
                 <a:solidFill>
                   <a:schemeClr val="tx1"/>
                 </a:solidFill>
@@ -4769,7 +4798,7 @@
               </a14:hiddenLine>
             </a:ext>
             <a:ext uri="{AF507438-7753-43E0-B8FC-AC1667EBCBE1}">
-              <a14:hiddenEffects xmlns:a14="http://schemas.microsoft.com/office/drawing/2010/main">
+              <a14:hiddenEffects xmlns="" xmlns:a14="http://schemas.microsoft.com/office/drawing/2010/main">
                 <a:effectLst>
                   <a:outerShdw dist="35921" dir="2700000" algn="ctr" rotWithShape="0">
                     <a:schemeClr val="bg2"/>
@@ -5416,10 +5445,10 @@
           <p:nvPr/>
         </p:nvPicPr>
         <p:blipFill>
-          <a:blip r:embed="rId5" cstate="print">
+          <a:blip r:embed="rId6" cstate="print">
             <a:extLst>
               <a:ext uri="{28A0092B-C50C-407E-A947-70E740481C1C}">
-                <a14:useLocalDpi xmlns:a14="http://schemas.microsoft.com/office/drawing/2010/main" val="0"/>
+                <a14:useLocalDpi xmlns="" xmlns:a14="http://schemas.microsoft.com/office/drawing/2010/main" val="0"/>
               </a:ext>
             </a:extLst>
           </a:blip>
@@ -5439,7 +5468,7 @@
           <a:noFill/>
           <a:extLst>
             <a:ext uri="{909E8E84-426E-40DD-AFC4-6F175D3DCCD1}">
-              <a14:hiddenFill xmlns:a14="http://schemas.microsoft.com/office/drawing/2010/main">
+              <a14:hiddenFill xmlns="" xmlns:a14="http://schemas.microsoft.com/office/drawing/2010/main">
                 <a:solidFill>
                   <a:srgbClr val="FFFFFF"/>
                 </a:solidFill>
@@ -5872,14 +5901,14 @@
       </p:sp>
       <p:sp>
         <p:nvSpPr>
-          <p:cNvPr id="5" name="TextBox 4"/>
+          <p:cNvPr id="56" name="TextBox 55"/>
           <p:cNvSpPr txBox="1"/>
           <p:nvPr/>
         </p:nvSpPr>
         <p:spPr>
           <a:xfrm>
-            <a:off x="412750" y="41870382"/>
-            <a:ext cx="16840200" cy="707886"/>
+            <a:off x="946150" y="11960094"/>
+            <a:ext cx="27432000" cy="769441"/>
           </a:xfrm>
           <a:prstGeom prst="rect">
             <a:avLst/>
@@ -5893,21 +5922,22 @@
           <a:lstStyle/>
           <a:p>
             <a:r>
-              <a:rPr lang="en-US" sz="4000" dirty="0"/>
-              <a:t>https://github.com/ahmadassaf/KBE</a:t>
-            </a:r>
-          </a:p>
-        </p:txBody>
-      </p:sp>
-      <p:sp>
-        <p:nvSpPr>
-          <p:cNvPr id="56" name="TextBox 55"/>
+              <a:rPr lang="en-US" sz="4400" b="1" dirty="0" smtClean="0"/>
+              <a:t>Motivation</a:t>
+            </a:r>
+            <a:endParaRPr lang="fr-FR" sz="4400" b="1" dirty="0"/>
+          </a:p>
+        </p:txBody>
+      </p:sp>
+      <p:sp>
+        <p:nvSpPr>
+          <p:cNvPr id="57" name="TextBox 56"/>
           <p:cNvSpPr txBox="1"/>
           <p:nvPr/>
         </p:nvSpPr>
         <p:spPr>
           <a:xfrm>
-            <a:off x="946150" y="11960094"/>
+            <a:off x="1022350" y="19347358"/>
             <a:ext cx="27432000" cy="769441"/>
           </a:xfrm>
           <a:prstGeom prst="rect">
@@ -5923,7 +5953,7 @@
           <a:p>
             <a:r>
               <a:rPr lang="en-US" sz="4400" b="1" dirty="0" smtClean="0"/>
-              <a:t>Motivation</a:t>
+              <a:t>Reverse Engineering the Knowledge Graph</a:t>
             </a:r>
             <a:endParaRPr lang="fr-FR" sz="4400" b="1" dirty="0"/>
           </a:p>
@@ -5931,14 +5961,14 @@
       </p:sp>
       <p:sp>
         <p:nvSpPr>
-          <p:cNvPr id="57" name="TextBox 56"/>
+          <p:cNvPr id="58" name="TextBox 57"/>
           <p:cNvSpPr txBox="1"/>
           <p:nvPr/>
         </p:nvSpPr>
         <p:spPr>
           <a:xfrm>
-            <a:off x="1022350" y="19347358"/>
-            <a:ext cx="27432000" cy="769441"/>
+            <a:off x="10712463" y="29008755"/>
+            <a:ext cx="27432000" cy="584775"/>
           </a:xfrm>
           <a:prstGeom prst="rect">
             <a:avLst/>
@@ -5951,24 +5981,25 @@
           </a:bodyPr>
           <a:lstStyle/>
           <a:p>
-            <a:r>
-              <a:rPr lang="en-US" sz="4400" b="1" dirty="0" smtClean="0"/>
-              <a:t>Reverse Engineering the Knowledge Graph</a:t>
-            </a:r>
-            <a:endParaRPr lang="fr-FR" sz="4400" b="1" dirty="0"/>
-          </a:p>
-        </p:txBody>
-      </p:sp>
-      <p:sp>
-        <p:nvSpPr>
-          <p:cNvPr id="58" name="TextBox 57"/>
+            <a:pPr algn="ctr"/>
+            <a:r>
+              <a:rPr lang="en-US" sz="3200" b="1" dirty="0" smtClean="0"/>
+              <a:t>Google’s Knowledge Panel (GKP) for Greece </a:t>
+            </a:r>
+            <a:endParaRPr lang="fr-FR" sz="3200" b="1" dirty="0"/>
+          </a:p>
+        </p:txBody>
+      </p:sp>
+      <p:sp>
+        <p:nvSpPr>
+          <p:cNvPr id="59" name="TextBox 58"/>
           <p:cNvSpPr txBox="1"/>
           <p:nvPr/>
         </p:nvSpPr>
         <p:spPr>
           <a:xfrm>
-            <a:off x="10712463" y="29008755"/>
-            <a:ext cx="27432000" cy="584775"/>
+            <a:off x="1152842" y="40233600"/>
+            <a:ext cx="28576183" cy="2123658"/>
           </a:xfrm>
           <a:prstGeom prst="rect">
             <a:avLst/>
@@ -5981,85 +6012,98 @@
           </a:bodyPr>
           <a:lstStyle/>
           <a:p>
-            <a:pPr algn="ctr"/>
-            <a:r>
-              <a:rPr lang="en-US" sz="3200" b="1" dirty="0" smtClean="0"/>
-              <a:t>Google’s Knowledge Panel (GKP) for Greece </a:t>
-            </a:r>
-            <a:endParaRPr lang="fr-FR" sz="3200" b="1" dirty="0"/>
-          </a:p>
-        </p:txBody>
-      </p:sp>
-      <p:sp>
-        <p:nvSpPr>
-          <p:cNvPr id="59" name="TextBox 58"/>
-          <p:cNvSpPr txBox="1"/>
+            <a:r>
+              <a:rPr lang="en-US" sz="4400" b="1" dirty="0" smtClean="0"/>
+              <a:t>By analyzing the results of the survey we discovered that concepts like </a:t>
+            </a:r>
+            <a:r>
+              <a:rPr lang="en-US" sz="4400" b="1" dirty="0" smtClean="0">
+                <a:solidFill>
+                  <a:srgbClr val="3799F3"/>
+                </a:solidFill>
+              </a:rPr>
+              <a:t>Book</a:t>
+            </a:r>
+            <a:r>
+              <a:rPr lang="en-US" sz="4400" b="1" dirty="0" smtClean="0"/>
+              <a:t> and </a:t>
+            </a:r>
+            <a:r>
+              <a:rPr lang="en-US" sz="4400" b="1" dirty="0" smtClean="0">
+                <a:solidFill>
+                  <a:srgbClr val="3799F3"/>
+                </a:solidFill>
+              </a:rPr>
+              <a:t>Museum</a:t>
+            </a:r>
+            <a:r>
+              <a:rPr lang="en-US" sz="4400" b="1" dirty="0" smtClean="0"/>
+              <a:t> are pretty stable (in agreement) compared to other concepts like </a:t>
+            </a:r>
+            <a:r>
+              <a:rPr lang="en-US" sz="4400" b="1" dirty="0" smtClean="0">
+                <a:solidFill>
+                  <a:srgbClr val="3799F3"/>
+                </a:solidFill>
+              </a:rPr>
+              <a:t>Person/Agent</a:t>
+            </a:r>
+          </a:p>
+          <a:p>
+            <a:r>
+              <a:rPr lang="en-US" sz="4400" b="1" dirty="0" smtClean="0"/>
+              <a:t>All results are reproducible from our code base at </a:t>
+            </a:r>
+            <a:r>
+              <a:rPr lang="en-US" sz="4400" b="1" dirty="0" smtClean="0">
+                <a:hlinkClick r:id="rId7"/>
+              </a:rPr>
+              <a:t>https://github.com/ahmadassaf/KBE</a:t>
+            </a:r>
+            <a:r>
+              <a:rPr lang="en-US" sz="4400" b="1" dirty="0" smtClean="0"/>
+              <a:t> </a:t>
+            </a:r>
+          </a:p>
+        </p:txBody>
+      </p:sp>
+      <p:pic>
+        <p:nvPicPr>
+          <p:cNvPr id="5" name="Picture 2"/>
+          <p:cNvPicPr>
+            <a:picLocks noChangeAspect="1" noChangeArrowheads="1"/>
+          </p:cNvPicPr>
           <p:nvPr/>
-        </p:nvSpPr>
-        <p:spPr>
-          <a:xfrm>
-            <a:off x="1152842" y="40233600"/>
-            <a:ext cx="28576183" cy="1446550"/>
+        </p:nvPicPr>
+        <p:blipFill>
+          <a:blip r:embed="rId8" cstate="print"/>
+          <a:srcRect/>
+          <a:stretch>
+            <a:fillRect/>
+          </a:stretch>
+        </p:blipFill>
+        <p:spPr bwMode="auto">
+          <a:xfrm>
+            <a:off x="26549350" y="3104187"/>
+            <a:ext cx="3200400" cy="1410663"/>
           </a:xfrm>
           <a:prstGeom prst="rect">
             <a:avLst/>
           </a:prstGeom>
           <a:noFill/>
-        </p:spPr>
-        <p:txBody>
-          <a:bodyPr wrap="square" rtlCol="0">
-            <a:spAutoFit/>
-          </a:bodyPr>
-          <a:lstStyle/>
-          <a:p>
-            <a:r>
-              <a:rPr lang="en-US" sz="4400" b="1" dirty="0" smtClean="0"/>
-              <a:t>By analyzing the results of the survey we discovered that concepts like </a:t>
-            </a:r>
-            <a:r>
-              <a:rPr lang="en-US" sz="4400" b="1" dirty="0" smtClean="0">
-                <a:solidFill>
-                  <a:srgbClr val="3799F3"/>
-                </a:solidFill>
-              </a:rPr>
-              <a:t>Book</a:t>
-            </a:r>
-            <a:r>
-              <a:rPr lang="en-US" sz="4400" b="1" dirty="0" smtClean="0"/>
-              <a:t> and </a:t>
-            </a:r>
-            <a:r>
-              <a:rPr lang="en-US" sz="4400" b="1" dirty="0" smtClean="0">
-                <a:solidFill>
-                  <a:srgbClr val="3799F3"/>
-                </a:solidFill>
-              </a:rPr>
-              <a:t>Museum</a:t>
-            </a:r>
-            <a:r>
-              <a:rPr lang="en-US" sz="4400" b="1" dirty="0" smtClean="0"/>
-              <a:t> are pretty stable (in agreement) compared to other concepts like </a:t>
-            </a:r>
-            <a:r>
-              <a:rPr lang="en-US" sz="4400" b="1" dirty="0" smtClean="0">
-                <a:solidFill>
-                  <a:srgbClr val="3799F3"/>
-                </a:solidFill>
-              </a:rPr>
-              <a:t>Person/Agent</a:t>
-            </a:r>
-            <a:endParaRPr lang="fr-FR" sz="4400" b="1" dirty="0">
-              <a:solidFill>
-                <a:srgbClr val="3799F3"/>
-              </a:solidFill>
-            </a:endParaRPr>
-          </a:p>
-        </p:txBody>
-      </p:sp>
+          <a:ln w="9525">
+            <a:noFill/>
+            <a:miter lim="800000"/>
+            <a:headEnd/>
+            <a:tailEnd/>
+          </a:ln>
+          <a:effectLst/>
+        </p:spPr>
+      </p:pic>
     </p:spTree>
     <p:extLst>
       <p:ext uri="{BB962C8B-B14F-4D97-AF65-F5344CB8AC3E}">
-        <p14:creationId xmlns:p14="http://schemas.microsoft.com/office/powerpoint/2010/main" val="1783528801"/>
+        <p14:creationId xmlns="" xmlns:p14="http://schemas.microsoft.com/office/powerpoint/2010/main" val="1783528801"/>
       </p:ext>
     </p:extLst>
   </p:cSld>

</xml_diff>